<commit_message>
update slide week 6
</commit_message>
<xml_diff>
--- a/Presentations/Presentation6_LinearModel.pptx
+++ b/Presentations/Presentation6_LinearModel.pptx
@@ -4481,8 +4481,8 @@
           </a:p>
         </p:txBody>
       </p:sp>
-      <mc:AlternateContent xmlns:mc="http://schemas.openxmlformats.org/markup-compatibility/2006">
-        <mc:Choice xmlns:a14="http://schemas.microsoft.com/office/drawing/2010/main" Requires="a14">
+      <mc:AlternateContent xmlns:mc="http://schemas.openxmlformats.org/markup-compatibility/2006" xmlns:a14="http://schemas.microsoft.com/office/drawing/2010/main">
+        <mc:Choice Requires="a14">
           <p:sp>
             <p:nvSpPr>
               <p:cNvPr id="3" name="Content Placeholder 2">
@@ -4743,7 +4743,7 @@
             </p:txBody>
           </p:sp>
         </mc:Choice>
-        <mc:Fallback>
+        <mc:Fallback xmlns="">
           <p:sp>
             <p:nvSpPr>
               <p:cNvPr id="3" name="Content Placeholder 2">
@@ -4817,6 +4817,96 @@
           </a:prstGeom>
         </p:spPr>
       </p:pic>
+      <p:pic>
+        <p:nvPicPr>
+          <p:cNvPr id="6" name="Picture 5">
+            <a:extLst>
+              <a:ext uri="{FF2B5EF4-FFF2-40B4-BE49-F238E27FC236}">
+                <a16:creationId xmlns:a16="http://schemas.microsoft.com/office/drawing/2014/main" id="{DBFFF2EF-161C-491A-99DF-31162F11FF8D}"/>
+              </a:ext>
+            </a:extLst>
+          </p:cNvPr>
+          <p:cNvPicPr>
+            <a:picLocks noChangeAspect="1"/>
+          </p:cNvPicPr>
+          <p:nvPr/>
+        </p:nvPicPr>
+        <p:blipFill>
+          <a:blip r:embed="rId3"/>
+          <a:stretch>
+            <a:fillRect/>
+          </a:stretch>
+        </p:blipFill>
+        <p:spPr>
+          <a:xfrm>
+            <a:off x="7075499" y="2282711"/>
+            <a:ext cx="4525607" cy="3095758"/>
+          </a:xfrm>
+          <a:prstGeom prst="rect">
+            <a:avLst/>
+          </a:prstGeom>
+        </p:spPr>
+      </p:pic>
+      <p:pic>
+        <p:nvPicPr>
+          <p:cNvPr id="7" name="Picture 6">
+            <a:extLst>
+              <a:ext uri="{FF2B5EF4-FFF2-40B4-BE49-F238E27FC236}">
+                <a16:creationId xmlns:a16="http://schemas.microsoft.com/office/drawing/2014/main" id="{9EEA9CC1-DBC5-4496-9A1F-D10E846182B0}"/>
+              </a:ext>
+            </a:extLst>
+          </p:cNvPr>
+          <p:cNvPicPr>
+            <a:picLocks noChangeAspect="1"/>
+          </p:cNvPicPr>
+          <p:nvPr/>
+        </p:nvPicPr>
+        <p:blipFill>
+          <a:blip r:embed="rId3"/>
+          <a:stretch>
+            <a:fillRect/>
+          </a:stretch>
+        </p:blipFill>
+        <p:spPr>
+          <a:xfrm>
+            <a:off x="7075499" y="2282711"/>
+            <a:ext cx="4525607" cy="3095758"/>
+          </a:xfrm>
+          <a:prstGeom prst="rect">
+            <a:avLst/>
+          </a:prstGeom>
+        </p:spPr>
+      </p:pic>
+      <p:pic>
+        <p:nvPicPr>
+          <p:cNvPr id="8" name="Picture 7">
+            <a:extLst>
+              <a:ext uri="{FF2B5EF4-FFF2-40B4-BE49-F238E27FC236}">
+                <a16:creationId xmlns:a16="http://schemas.microsoft.com/office/drawing/2014/main" id="{40F457BF-926C-4894-B953-997D316C9AD5}"/>
+              </a:ext>
+            </a:extLst>
+          </p:cNvPr>
+          <p:cNvPicPr>
+            <a:picLocks noChangeAspect="1"/>
+          </p:cNvPicPr>
+          <p:nvPr/>
+        </p:nvPicPr>
+        <p:blipFill>
+          <a:blip r:embed="rId3"/>
+          <a:stretch>
+            <a:fillRect/>
+          </a:stretch>
+        </p:blipFill>
+        <p:spPr>
+          <a:xfrm>
+            <a:off x="7075498" y="2282711"/>
+            <a:ext cx="4525607" cy="3095758"/>
+          </a:xfrm>
+          <a:prstGeom prst="rect">
+            <a:avLst/>
+          </a:prstGeom>
+        </p:spPr>
+      </p:pic>
     </p:spTree>
     <p:extLst>
       <p:ext uri="{BB962C8B-B14F-4D97-AF65-F5344CB8AC3E}">
@@ -4894,13 +4984,13 @@
         </p:nvSpPr>
         <p:spPr>
           <a:xfrm>
-            <a:off x="838200" y="6163977"/>
-            <a:ext cx="10515600" cy="394705"/>
+            <a:off x="838200" y="6263951"/>
+            <a:ext cx="10515600" cy="294731"/>
           </a:xfrm>
         </p:spPr>
         <p:txBody>
           <a:bodyPr>
-            <a:normAutofit/>
+            <a:normAutofit fontScale="70000" lnSpcReduction="20000"/>
           </a:bodyPr>
           <a:lstStyle/>
           <a:p>
@@ -4914,7 +5004,7 @@
             </a:r>
             <a:r>
               <a:rPr lang="en-US" sz="2000" dirty="0"/>
-              <a:t>, 2021)</a:t>
+              <a:t>, 2021 - https://github.com/CoAxLab/DataSciencePsychNeuro/blob/master/Slides/09%20-%20Linear%20models.pdf)</a:t>
             </a:r>
             <a:endParaRPr lang="LID4096" sz="2000" dirty="0"/>
           </a:p>
@@ -5033,7 +5123,7 @@
         </p:spPr>
         <p:txBody>
           <a:bodyPr>
-            <a:normAutofit/>
+            <a:normAutofit fontScale="70000" lnSpcReduction="20000"/>
           </a:bodyPr>
           <a:lstStyle/>
           <a:p>
@@ -5047,7 +5137,7 @@
             </a:r>
             <a:r>
               <a:rPr lang="en-US" sz="2000" dirty="0"/>
-              <a:t>, 2021)</a:t>
+              <a:t>, 2021 - https://github.com/CoAxLab/DataSciencePsychNeuro/blob/master/Slides/09%20-%20Linear%20models.pdf)</a:t>
             </a:r>
             <a:endParaRPr lang="LID4096" sz="2000" dirty="0"/>
           </a:p>
@@ -5166,7 +5256,7 @@
         </p:spPr>
         <p:txBody>
           <a:bodyPr>
-            <a:normAutofit/>
+            <a:normAutofit fontScale="70000" lnSpcReduction="20000"/>
           </a:bodyPr>
           <a:lstStyle/>
           <a:p>
@@ -5180,7 +5270,7 @@
             </a:r>
             <a:r>
               <a:rPr lang="en-US" sz="2000" dirty="0"/>
-              <a:t>, 2021)</a:t>
+              <a:t>, 2021 - https://github.com/CoAxLab/DataSciencePsychNeuro/blob/master/Slides/09%20-%20Linear%20models.pdf)</a:t>
             </a:r>
             <a:endParaRPr lang="LID4096" sz="2000" dirty="0"/>
           </a:p>
@@ -5299,7 +5389,7 @@
         </p:spPr>
         <p:txBody>
           <a:bodyPr>
-            <a:normAutofit/>
+            <a:normAutofit fontScale="70000" lnSpcReduction="20000"/>
           </a:bodyPr>
           <a:lstStyle/>
           <a:p>
@@ -5313,7 +5403,7 @@
             </a:r>
             <a:r>
               <a:rPr lang="en-US" sz="2000" dirty="0"/>
-              <a:t>, 2021)</a:t>
+              <a:t>, 2021 - https://github.com/CoAxLab/DataSciencePsychNeuro/blob/master/Slides/09%20-%20Linear%20models.pdf)</a:t>
             </a:r>
             <a:endParaRPr lang="LID4096" sz="2000" dirty="0"/>
           </a:p>

</xml_diff>